<commit_message>
Presentation - changed presentation
</commit_message>
<xml_diff>
--- a/docs/images/poster&präse/20161124_Präsentation.pptx
+++ b/docs/images/poster&präse/20161124_Präsentation.pptx
@@ -15,7 +15,8 @@
     <p:sldId id="262" r:id="rId9"/>
     <p:sldId id="263" r:id="rId10"/>
     <p:sldId id="261" r:id="rId11"/>
-    <p:sldId id="264" r:id="rId12"/>
+    <p:sldId id="266" r:id="rId12"/>
+    <p:sldId id="264" r:id="rId13"/>
   </p:sldIdLst>
   <p:sldSz cx="12192000" cy="6858000"/>
   <p:notesSz cx="6858000" cy="9144000"/>
@@ -9126,6 +9127,264 @@
       </p:grpSpPr>
       <p:sp>
         <p:nvSpPr>
+          <p:cNvPr id="2" name="Titel 1"/>
+          <p:cNvSpPr>
+            <a:spLocks noGrp="1"/>
+          </p:cNvSpPr>
+          <p:nvPr>
+            <p:ph type="title"/>
+          </p:nvPr>
+        </p:nvSpPr>
+        <p:spPr/>
+        <p:txBody>
+          <a:bodyPr/>
+          <a:lstStyle/>
+          <a:p>
+            <a:r>
+              <a:rPr lang="de-DE" dirty="0" smtClean="0"/>
+              <a:t>Vom Prototypen zum finalem Produkt:</a:t>
+            </a:r>
+            <a:endParaRPr lang="de-DE" dirty="0"/>
+          </a:p>
+        </p:txBody>
+      </p:sp>
+      <p:sp>
+        <p:nvSpPr>
+          <p:cNvPr id="3" name="Inhaltsplatzhalter 2"/>
+          <p:cNvSpPr>
+            <a:spLocks noGrp="1"/>
+          </p:cNvSpPr>
+          <p:nvPr>
+            <p:ph sz="half" idx="1"/>
+          </p:nvPr>
+        </p:nvSpPr>
+        <p:spPr/>
+        <p:txBody>
+          <a:bodyPr>
+            <a:normAutofit/>
+          </a:bodyPr>
+          <a:lstStyle/>
+          <a:p>
+            <a:pPr marL="0" indent="0">
+              <a:spcAft>
+                <a:spcPts val="3000"/>
+              </a:spcAft>
+              <a:buNone/>
+              <a:defRPr/>
+            </a:pPr>
+            <a:r>
+              <a:rPr lang="de-DE" dirty="0" err="1" smtClean="0">
+                <a:latin typeface="Verdana"/>
+                <a:cs typeface="Verdana"/>
+              </a:rPr>
+              <a:t>Eventlistening</a:t>
+            </a:r>
+            <a:r>
+              <a:rPr lang="de-DE" dirty="0" smtClean="0">
+                <a:latin typeface="Verdana"/>
+                <a:cs typeface="Verdana"/>
+              </a:rPr>
+              <a:t> </a:t>
+            </a:r>
+            <a:r>
+              <a:rPr lang="de-DE" dirty="0">
+                <a:latin typeface="Verdana"/>
+                <a:cs typeface="Verdana"/>
+              </a:rPr>
+              <a:t>ermöglichen</a:t>
+            </a:r>
+          </a:p>
+          <a:p>
+            <a:pPr marL="0" indent="0">
+              <a:spcAft>
+                <a:spcPts val="3000"/>
+              </a:spcAft>
+              <a:buNone/>
+              <a:defRPr/>
+            </a:pPr>
+            <a:r>
+              <a:rPr lang="de-DE" dirty="0">
+                <a:latin typeface="Verdana"/>
+                <a:cs typeface="Verdana"/>
+              </a:rPr>
+              <a:t>Lokale Datenbanken bei der App und Datenbank beim Backend verwenden</a:t>
+            </a:r>
+          </a:p>
+          <a:p>
+            <a:pPr marL="0" indent="0">
+              <a:spcAft>
+                <a:spcPts val="3000"/>
+              </a:spcAft>
+              <a:buNone/>
+              <a:defRPr/>
+            </a:pPr>
+            <a:r>
+              <a:rPr lang="de-DE" dirty="0">
+                <a:latin typeface="Verdana"/>
+                <a:cs typeface="Verdana"/>
+              </a:rPr>
+              <a:t>Keine hart codierten Werte </a:t>
+            </a:r>
+            <a:r>
+              <a:rPr lang="de-DE" dirty="0" smtClean="0">
+                <a:latin typeface="Verdana"/>
+                <a:cs typeface="Verdana"/>
+              </a:rPr>
+              <a:t>verwenden</a:t>
+            </a:r>
+          </a:p>
+          <a:p>
+            <a:pPr marL="0" indent="0">
+              <a:spcAft>
+                <a:spcPts val="3000"/>
+              </a:spcAft>
+              <a:buNone/>
+              <a:defRPr/>
+            </a:pPr>
+            <a:r>
+              <a:rPr lang="de-DE" dirty="0">
+                <a:latin typeface="Verdana"/>
+                <a:cs typeface="Verdana"/>
+              </a:rPr>
+              <a:t>Auswählen eigener </a:t>
+            </a:r>
+            <a:r>
+              <a:rPr lang="de-DE" dirty="0" smtClean="0">
+                <a:latin typeface="Verdana"/>
+                <a:cs typeface="Verdana"/>
+              </a:rPr>
+              <a:t>Musikstücke</a:t>
+            </a:r>
+            <a:endParaRPr lang="de-DE" dirty="0">
+              <a:latin typeface="Verdana"/>
+              <a:cs typeface="Verdana"/>
+            </a:endParaRPr>
+          </a:p>
+        </p:txBody>
+      </p:sp>
+      <p:sp>
+        <p:nvSpPr>
+          <p:cNvPr id="4" name="Inhaltsplatzhalter 3"/>
+          <p:cNvSpPr>
+            <a:spLocks noGrp="1"/>
+          </p:cNvSpPr>
+          <p:nvPr>
+            <p:ph sz="half" idx="2"/>
+          </p:nvPr>
+        </p:nvSpPr>
+        <p:spPr/>
+        <p:txBody>
+          <a:bodyPr>
+            <a:normAutofit/>
+          </a:bodyPr>
+          <a:lstStyle/>
+          <a:p>
+            <a:pPr marL="0" indent="0">
+              <a:spcAft>
+                <a:spcPts val="3000"/>
+              </a:spcAft>
+              <a:buNone/>
+              <a:defRPr/>
+            </a:pPr>
+            <a:r>
+              <a:rPr lang="de-DE" dirty="0" smtClean="0">
+                <a:latin typeface="Verdana"/>
+                <a:cs typeface="Verdana"/>
+              </a:rPr>
+              <a:t>Implementation </a:t>
+            </a:r>
+            <a:r>
+              <a:rPr lang="de-DE" dirty="0">
+                <a:latin typeface="Verdana"/>
+                <a:cs typeface="Verdana"/>
+              </a:rPr>
+              <a:t>weiterer Services um die volle Funktionalität zu gewährleisten</a:t>
+            </a:r>
+          </a:p>
+          <a:p>
+            <a:pPr marL="0" indent="0">
+              <a:spcAft>
+                <a:spcPts val="3000"/>
+              </a:spcAft>
+              <a:buNone/>
+              <a:defRPr/>
+            </a:pPr>
+            <a:r>
+              <a:rPr lang="de-DE" dirty="0">
+                <a:latin typeface="Verdana"/>
+                <a:cs typeface="Verdana"/>
+              </a:rPr>
+              <a:t>Eingabevalidierungen und Plausibilitätsabfragen</a:t>
+            </a:r>
+          </a:p>
+          <a:p>
+            <a:pPr marL="0" indent="0">
+              <a:spcAft>
+                <a:spcPts val="3000"/>
+              </a:spcAft>
+              <a:buNone/>
+              <a:defRPr/>
+            </a:pPr>
+            <a:r>
+              <a:rPr lang="de-DE" dirty="0" err="1">
+                <a:latin typeface="Verdana"/>
+                <a:cs typeface="Verdana"/>
+              </a:rPr>
+              <a:t>Deployment</a:t>
+            </a:r>
+            <a:r>
+              <a:rPr lang="de-DE" dirty="0">
+                <a:latin typeface="Verdana"/>
+                <a:cs typeface="Verdana"/>
+              </a:rPr>
+              <a:t> ins entsprechende </a:t>
+            </a:r>
+            <a:r>
+              <a:rPr lang="de-DE" dirty="0" smtClean="0">
+                <a:latin typeface="Verdana"/>
+                <a:cs typeface="Verdana"/>
+              </a:rPr>
+              <a:t>Marketplace</a:t>
+            </a:r>
+            <a:endParaRPr lang="de-DE" dirty="0">
+              <a:latin typeface="Verdana"/>
+              <a:cs typeface="Verdana"/>
+            </a:endParaRPr>
+          </a:p>
+        </p:txBody>
+      </p:sp>
+    </p:spTree>
+    <p:extLst>
+      <p:ext uri="{BB962C8B-B14F-4D97-AF65-F5344CB8AC3E}">
+        <p14:creationId xmlns:p14="http://schemas.microsoft.com/office/powerpoint/2010/main" val="3663539192"/>
+      </p:ext>
+    </p:extLst>
+  </p:cSld>
+  <p:clrMapOvr>
+    <a:masterClrMapping/>
+  </p:clrMapOvr>
+</p:sld>
+</file>
+
+<file path=ppt/slides/slide11.xml><?xml version="1.0" encoding="utf-8"?>
+<p:sld xmlns:a="http://schemas.openxmlformats.org/drawingml/2006/main" xmlns:r="http://schemas.openxmlformats.org/officeDocument/2006/relationships" xmlns:p="http://schemas.openxmlformats.org/presentationml/2006/main">
+  <p:cSld>
+    <p:spTree>
+      <p:nvGrpSpPr>
+        <p:cNvPr id="1" name=""/>
+        <p:cNvGrpSpPr/>
+        <p:nvPr/>
+      </p:nvGrpSpPr>
+      <p:grpSpPr>
+        <a:xfrm>
+          <a:off x="0" y="0"/>
+          <a:ext cx="0" cy="0"/>
+          <a:chOff x="0" y="0"/>
+          <a:chExt cx="0" cy="0"/>
+        </a:xfrm>
+      </p:grpSpPr>
+      <p:sp>
+        <p:nvSpPr>
           <p:cNvPr id="4" name="Titel 3"/>
           <p:cNvSpPr>
             <a:spLocks noGrp="1"/>
@@ -10086,11 +10345,7 @@
             <a:pPr lvl="1"/>
             <a:r>
               <a:rPr lang="de-DE" dirty="0" smtClean="0"/>
-              <a:t>Bestimmte Module existieren oder funktionieren nicht (Alarm, Trigger, usw</a:t>
-            </a:r>
-            <a:r>
-              <a:rPr lang="de-DE" dirty="0" smtClean="0"/>
-              <a:t>.)</a:t>
+              <a:t>Bestimmte Module existieren oder funktionieren nicht (Alarm, Trigger, usw.)</a:t>
             </a:r>
           </a:p>
           <a:p>

</xml_diff>

<commit_message>
Doc finalized - finalized documentation
</commit_message>
<xml_diff>
--- a/docs/images/poster&präse/20161124_Präsentation.pptx
+++ b/docs/images/poster&präse/20161124_Präsentation.pptx
@@ -9054,12 +9054,8 @@
           <a:lstStyle/>
           <a:p>
             <a:r>
-              <a:rPr lang="de-DE" dirty="0" err="1" smtClean="0"/>
-              <a:t>Wachfach</a:t>
-            </a:r>
-            <a:r>
               <a:rPr lang="de-DE" dirty="0" smtClean="0"/>
-              <a:t> </a:t>
+              <a:t>Wahlfach </a:t>
             </a:r>
             <a:r>
               <a:rPr lang="de-DE" dirty="0" err="1" smtClean="0"/>
@@ -9142,7 +9138,19 @@
           <a:p>
             <a:r>
               <a:rPr lang="de-DE" dirty="0" smtClean="0"/>
-              <a:t>Vom Prototypen zum finalem Produkt:</a:t>
+              <a:t>Vom Prototypen </a:t>
+            </a:r>
+            <a:r>
+              <a:rPr lang="de-DE" smtClean="0"/>
+              <a:t>zum </a:t>
+            </a:r>
+            <a:r>
+              <a:rPr lang="de-DE" smtClean="0"/>
+              <a:t>finalen </a:t>
+            </a:r>
+            <a:r>
+              <a:rPr lang="de-DE" dirty="0" smtClean="0"/>
+              <a:t>Produkt:</a:t>
             </a:r>
             <a:endParaRPr lang="de-DE" dirty="0"/>
           </a:p>
@@ -9363,6 +9371,13 @@
   <p:clrMapOvr>
     <a:masterClrMapping/>
   </p:clrMapOvr>
+  <p:timing>
+    <p:tnLst>
+      <p:par>
+        <p:cTn id="1" dur="indefinite" restart="never" nodeType="tmRoot"/>
+      </p:par>
+    </p:tnLst>
+  </p:timing>
 </p:sld>
 </file>
 
@@ -9488,7 +9503,15 @@
           <a:p>
             <a:r>
               <a:rPr lang="de-DE" dirty="0"/>
-              <a:t>MVP: Erstellung einer Wecker App. Diese soll beim auslösen eines Alarms eine Lampe ansteuern. Die Lampe soll dabei den Aufgang einer Sonne simulieren</a:t>
+              <a:t>MVP: Erstellung einer Wecker App. Diese soll beim </a:t>
+            </a:r>
+            <a:r>
+              <a:rPr lang="de-DE" dirty="0" smtClean="0"/>
+              <a:t>auslösen </a:t>
+            </a:r>
+            <a:r>
+              <a:rPr lang="de-DE" dirty="0"/>
+              <a:t>eines Alarms eine Lampe ansteuern. Die Lampe soll dabei den Aufgang einer Sonne simulieren</a:t>
             </a:r>
             <a:r>
               <a:rPr lang="de-DE" dirty="0" smtClean="0"/>
@@ -9718,7 +9741,17 @@
           <a:p>
             <a:r>
               <a:rPr lang="de-DE" dirty="0" smtClean="0"/>
-              <a:t>Probleme während der Entwicklung</a:t>
+              <a:t>Probleme während der </a:t>
+            </a:r>
+            <a:r>
+              <a:rPr lang="de-DE" dirty="0" smtClean="0"/>
+              <a:t>Entwicklung</a:t>
+            </a:r>
+          </a:p>
+          <a:p>
+            <a:r>
+              <a:rPr lang="de-DE" dirty="0" smtClean="0"/>
+              <a:t>Vom Prototypen zum finalen Produkt</a:t>
             </a:r>
             <a:endParaRPr lang="de-DE" dirty="0"/>
           </a:p>

</xml_diff>